<commit_message>
new module 2 homeworks. Daily announcements
</commit_message>
<xml_diff>
--- a/slides/dailyannouncements_mf.pptx
+++ b/slides/dailyannouncements_mf.pptx
@@ -5,21 +5,22 @@
     <p:sldMasterId id="2147483728" r:id="rId1"/>
   </p:sldMasterIdLst>
   <p:notesMasterIdLst>
-    <p:notesMasterId r:id="rId6"/>
+    <p:notesMasterId r:id="rId7"/>
   </p:notesMasterIdLst>
   <p:handoutMasterIdLst>
-    <p:handoutMasterId r:id="rId7"/>
+    <p:handoutMasterId r:id="rId8"/>
   </p:handoutMasterIdLst>
   <p:sldIdLst>
     <p:sldId id="447" r:id="rId2"/>
     <p:sldId id="484" r:id="rId3"/>
     <p:sldId id="402" r:id="rId4"/>
     <p:sldId id="485" r:id="rId5"/>
+    <p:sldId id="486" r:id="rId6"/>
   </p:sldIdLst>
   <p:sldSz cx="9144000" cy="6858000" type="screen4x3"/>
   <p:notesSz cx="7315200" cy="9601200"/>
   <p:custDataLst>
-    <p:tags r:id="rId8"/>
+    <p:tags r:id="rId9"/>
   </p:custDataLst>
   <p:defaultTextStyle>
     <a:defPPr>
@@ -1019,7 +1020,7 @@
             <a:fld id="{E4886CB5-510A-4EF6-9466-BC7A8F0DDE87}" type="datetime1">
               <a:rPr lang="en-US" smtClean="0"/>
               <a:pPr/>
-              <a:t>2/10/21</a:t>
+              <a:t>2/15/21</a:t>
             </a:fld>
             <a:endParaRPr lang="en-US"/>
           </a:p>
@@ -1379,7 +1380,7 @@
             <a:fld id="{9B297853-24B4-4D05-83E4-0AD2E86C55E5}" type="datetime1">
               <a:rPr lang="en-US" smtClean="0"/>
               <a:pPr/>
-              <a:t>2/10/21</a:t>
+              <a:t>2/15/21</a:t>
             </a:fld>
             <a:endParaRPr lang="en-US"/>
           </a:p>
@@ -1555,7 +1556,7 @@
             <a:fld id="{01FCDD9E-5768-4705-9537-0C020B1BB310}" type="datetime1">
               <a:rPr lang="en-US" smtClean="0"/>
               <a:pPr/>
-              <a:t>2/10/21</a:t>
+              <a:t>2/15/21</a:t>
             </a:fld>
             <a:endParaRPr lang="en-US"/>
           </a:p>
@@ -1791,7 +1792,7 @@
             <a:fld id="{4257C27E-59C2-41CA-9776-94955CBEE440}" type="datetime1">
               <a:rPr lang="en-US" smtClean="0"/>
               <a:pPr/>
-              <a:t>2/10/21</a:t>
+              <a:t>2/15/21</a:t>
             </a:fld>
             <a:endParaRPr lang="en-US"/>
           </a:p>
@@ -2077,7 +2078,7 @@
             <a:fld id="{03180747-A137-49C6-9C74-AB7EE86F4904}" type="datetime1">
               <a:rPr lang="en-US" smtClean="0"/>
               <a:pPr/>
-              <a:t>2/10/21</a:t>
+              <a:t>2/15/21</a:t>
             </a:fld>
             <a:endParaRPr lang="en-US"/>
           </a:p>
@@ -2298,7 +2299,7 @@
             <a:fld id="{EBBA31D9-ADC1-480D-86A8-1EAFB6A86A35}" type="datetime1">
               <a:rPr lang="en-US" smtClean="0"/>
               <a:pPr/>
-              <a:t>2/10/21</a:t>
+              <a:t>2/15/21</a:t>
             </a:fld>
             <a:endParaRPr lang="en-US"/>
           </a:p>
@@ -2651,7 +2652,7 @@
             <a:fld id="{80AAE9AE-3B2F-4DEA-8C41-BDDF4CDF6F40}" type="datetime1">
               <a:rPr lang="en-US" smtClean="0"/>
               <a:pPr/>
-              <a:t>2/10/21</a:t>
+              <a:t>2/15/21</a:t>
             </a:fld>
             <a:endParaRPr lang="en-US"/>
           </a:p>
@@ -2884,7 +2885,7 @@
             <a:fld id="{48252F7F-E8FE-413B-8521-D4ED924C6DE5}" type="datetime1">
               <a:rPr lang="en-US" smtClean="0"/>
               <a:pPr/>
-              <a:t>2/10/21</a:t>
+              <a:t>2/15/21</a:t>
             </a:fld>
             <a:endParaRPr lang="en-US"/>
           </a:p>
@@ -3026,7 +3027,7 @@
             <a:fld id="{2FF1B124-70E3-4E4A-90E2-6B55DB7659B3}" type="datetime1">
               <a:rPr lang="en-US" smtClean="0"/>
               <a:pPr/>
-              <a:t>2/10/21</a:t>
+              <a:t>2/15/21</a:t>
             </a:fld>
             <a:endParaRPr lang="en-US"/>
           </a:p>
@@ -3304,7 +3305,7 @@
             <a:fld id="{4EBF4C98-3CD6-4C87-BD40-5718C2628835}" type="datetime1">
               <a:rPr lang="en-US" smtClean="0"/>
               <a:pPr/>
-              <a:t>2/10/21</a:t>
+              <a:t>2/15/21</a:t>
             </a:fld>
             <a:endParaRPr lang="en-US"/>
           </a:p>
@@ -3712,7 +3713,7 @@
             <a:fld id="{6D6408A8-6B1B-4CDA-875E-7BEECDBA31DF}" type="datetime1">
               <a:rPr lang="en-US" smtClean="0"/>
               <a:pPr/>
-              <a:t>2/10/21</a:t>
+              <a:t>2/15/21</a:t>
             </a:fld>
             <a:endParaRPr lang="en-US"/>
           </a:p>
@@ -4050,7 +4051,7 @@
             <a:fld id="{C55AAF07-D2F5-4B3C-B443-40DE8C337A77}" type="datetime1">
               <a:rPr lang="en-US" smtClean="0"/>
               <a:pPr/>
-              <a:t>2/10/21</a:t>
+              <a:t>2/15/21</a:t>
             </a:fld>
             <a:endParaRPr lang="en-US"/>
           </a:p>
@@ -5168,6 +5169,177 @@
 </p:sld>
 </file>
 
+<file path=ppt/slides/slide5.xml><?xml version="1.0" encoding="utf-8"?>
+<p:sld xmlns:a="http://schemas.openxmlformats.org/drawingml/2006/main" xmlns:r="http://schemas.openxmlformats.org/officeDocument/2006/relationships" xmlns:p="http://schemas.openxmlformats.org/presentationml/2006/main">
+  <p:cSld>
+    <p:spTree>
+      <p:nvGrpSpPr>
+        <p:cNvPr id="1" name=""/>
+        <p:cNvGrpSpPr/>
+        <p:nvPr/>
+      </p:nvGrpSpPr>
+      <p:grpSpPr>
+        <a:xfrm>
+          <a:off x="0" y="0"/>
+          <a:ext cx="0" cy="0"/>
+          <a:chOff x="0" y="0"/>
+          <a:chExt cx="0" cy="0"/>
+        </a:xfrm>
+      </p:grpSpPr>
+      <p:sp>
+        <p:nvSpPr>
+          <p:cNvPr id="6146" name="Rectangle 2"/>
+          <p:cNvSpPr>
+            <a:spLocks noGrp="1" noChangeArrowheads="1"/>
+          </p:cNvSpPr>
+          <p:nvPr>
+            <p:ph type="title"/>
+            <p:custDataLst>
+              <p:tags r:id="rId1"/>
+            </p:custDataLst>
+          </p:nvPr>
+        </p:nvSpPr>
+        <p:spPr/>
+        <p:txBody>
+          <a:bodyPr/>
+          <a:lstStyle/>
+          <a:p>
+            <a:r>
+              <a:rPr lang="en-US" dirty="0"/>
+              <a:t>Monday, Feb. 15</a:t>
+            </a:r>
+          </a:p>
+        </p:txBody>
+      </p:sp>
+      <p:sp>
+        <p:nvSpPr>
+          <p:cNvPr id="6147" name="Rectangle 3"/>
+          <p:cNvSpPr>
+            <a:spLocks noGrp="1" noChangeArrowheads="1"/>
+          </p:cNvSpPr>
+          <p:nvPr>
+            <p:ph sz="quarter" idx="1"/>
+            <p:custDataLst>
+              <p:tags r:id="rId2"/>
+            </p:custDataLst>
+          </p:nvPr>
+        </p:nvSpPr>
+        <p:spPr>
+          <a:xfrm>
+            <a:off x="381000" y="1371600"/>
+            <a:ext cx="8255000" cy="4800600"/>
+          </a:xfrm>
+        </p:spPr>
+        <p:txBody>
+          <a:bodyPr>
+            <a:normAutofit/>
+          </a:bodyPr>
+          <a:lstStyle/>
+          <a:p>
+            <a:r>
+              <a:rPr lang="en-US" dirty="0" err="1"/>
+              <a:t>Gradescope</a:t>
+            </a:r>
+            <a:r>
+              <a:rPr lang="en-US" dirty="0"/>
+              <a:t> is live (link via Collab to sign up)</a:t>
+            </a:r>
+          </a:p>
+          <a:p>
+            <a:pPr lvl="1"/>
+            <a:r>
+              <a:rPr lang="en-US" dirty="0"/>
+              <a:t>Made some cosmetic changes to programming </a:t>
+            </a:r>
+            <a:r>
+              <a:rPr lang="en-US" dirty="0" err="1"/>
+              <a:t>hws</a:t>
+            </a:r>
+            <a:endParaRPr lang="en-US" dirty="0"/>
+          </a:p>
+          <a:p>
+            <a:r>
+              <a:rPr lang="en-US" dirty="0"/>
+              <a:t>Recommended schedule up on schedule page of website. </a:t>
+            </a:r>
+          </a:p>
+          <a:p>
+            <a:pPr lvl="1"/>
+            <a:r>
+              <a:rPr lang="en-US" dirty="0"/>
+              <a:t>Recommended that “distancing” be done this week</a:t>
+            </a:r>
+          </a:p>
+          <a:p>
+            <a:r>
+              <a:rPr lang="en-US" dirty="0"/>
+              <a:t>Sample HW assignment is up on webpage and GS</a:t>
+            </a:r>
+          </a:p>
+          <a:p>
+            <a:pPr lvl="1"/>
+            <a:r>
+              <a:rPr lang="en-US" dirty="0"/>
+              <a:t>For your benefit if you want it, not required.</a:t>
+            </a:r>
+          </a:p>
+          <a:p>
+            <a:r>
+              <a:rPr lang="en-US" dirty="0"/>
+              <a:t>Office hours going ok?</a:t>
+            </a:r>
+          </a:p>
+          <a:p>
+            <a:r>
+              <a:rPr lang="en-US" dirty="0"/>
+              <a:t>Don’t forget Wednesday is a break day so no class!</a:t>
+            </a:r>
+          </a:p>
+          <a:p>
+            <a:r>
+              <a:rPr lang="en-US" dirty="0"/>
+              <a:t>Today we will do quicksort and closest pair of points!</a:t>
+            </a:r>
+          </a:p>
+        </p:txBody>
+      </p:sp>
+      <p:sp>
+        <p:nvSpPr>
+          <p:cNvPr id="4" name="Slide Number Placeholder 3"/>
+          <p:cNvSpPr>
+            <a:spLocks noGrp="1"/>
+          </p:cNvSpPr>
+          <p:nvPr>
+            <p:ph type="sldNum" sz="quarter" idx="12"/>
+          </p:nvPr>
+        </p:nvSpPr>
+        <p:spPr/>
+        <p:txBody>
+          <a:bodyPr/>
+          <a:lstStyle/>
+          <a:p>
+            <a:fld id="{F26D9103-0C5C-48AC-B68E-3ED2C1647047}" type="slidenum">
+              <a:rPr lang="en-US" smtClean="0"/>
+              <a:pPr/>
+              <a:t>5</a:t>
+            </a:fld>
+            <a:endParaRPr lang="en-US" dirty="0"/>
+          </a:p>
+        </p:txBody>
+      </p:sp>
+    </p:spTree>
+    <p:extLst>
+      <p:ext uri="{BB962C8B-B14F-4D97-AF65-F5344CB8AC3E}">
+        <p14:creationId xmlns:p14="http://schemas.microsoft.com/office/powerpoint/2010/main" val="2456874854"/>
+      </p:ext>
+    </p:extLst>
+  </p:cSld>
+  <p:clrMapOvr>
+    <a:masterClrMapping/>
+  </p:clrMapOvr>
+</p:sld>
+</file>
+
 <file path=ppt/tags/tag1.xml><?xml version="1.0" encoding="utf-8"?>
 <p:tagLst xmlns:a="http://schemas.openxmlformats.org/drawingml/2006/main" xmlns:r="http://schemas.openxmlformats.org/officeDocument/2006/relationships" xmlns:p="http://schemas.openxmlformats.org/presentationml/2006/main">
   <p:tag name="_INSTRUCTOR VIEW19C14C36-AC8E-43BC-9DB6-C2AAF774C7DC|PANE__TAG" val="_"/>
@@ -5193,6 +5365,18 @@
 </file>
 
 <file path=ppt/tags/tag5.xml><?xml version="1.0" encoding="utf-8"?>
+<p:tagLst xmlns:a="http://schemas.openxmlformats.org/drawingml/2006/main" xmlns:r="http://schemas.openxmlformats.org/officeDocument/2006/relationships" xmlns:p="http://schemas.openxmlformats.org/presentationml/2006/main">
+  <p:tag name="_INSTRUCTOR VIEW19C14C36-AC8E-43BC-9DB6-C2AAF774C7DC|PANE__TAG" val="_"/>
+</p:tagLst>
+</file>
+
+<file path=ppt/tags/tag6.xml><?xml version="1.0" encoding="utf-8"?>
+<p:tagLst xmlns:a="http://schemas.openxmlformats.org/drawingml/2006/main" xmlns:r="http://schemas.openxmlformats.org/officeDocument/2006/relationships" xmlns:p="http://schemas.openxmlformats.org/presentationml/2006/main">
+  <p:tag name="_INSTRUCTOR VIEW19C14C36-AC8E-43BC-9DB6-C2AAF774C7DC|PANE__TAG" val="_"/>
+</p:tagLst>
+</file>
+
+<file path=ppt/tags/tag7.xml><?xml version="1.0" encoding="utf-8"?>
 <p:tagLst xmlns:a="http://schemas.openxmlformats.org/drawingml/2006/main" xmlns:r="http://schemas.openxmlformats.org/officeDocument/2006/relationships" xmlns:p="http://schemas.openxmlformats.org/presentationml/2006/main">
   <p:tag name="_INSTRUCTOR VIEW19C14C36-AC8E-43BC-9DB6-C2AAF774C7DC|PANE__TAG" val="_"/>
 </p:tagLst>

</xml_diff>

<commit_message>
new homeworks module 3
</commit_message>
<xml_diff>
--- a/slides/dailyannouncements_mf.pptx
+++ b/slides/dailyannouncements_mf.pptx
@@ -5,10 +5,10 @@
     <p:sldMasterId id="2147483728" r:id="rId1"/>
   </p:sldMasterIdLst>
   <p:notesMasterIdLst>
-    <p:notesMasterId r:id="rId15"/>
+    <p:notesMasterId r:id="rId16"/>
   </p:notesMasterIdLst>
   <p:handoutMasterIdLst>
-    <p:handoutMasterId r:id="rId16"/>
+    <p:handoutMasterId r:id="rId17"/>
   </p:handoutMasterIdLst>
   <p:sldIdLst>
     <p:sldId id="447" r:id="rId2"/>
@@ -24,11 +24,12 @@
     <p:sldId id="492" r:id="rId12"/>
     <p:sldId id="493" r:id="rId13"/>
     <p:sldId id="494" r:id="rId14"/>
+    <p:sldId id="495" r:id="rId15"/>
   </p:sldIdLst>
   <p:sldSz cx="9144000" cy="6858000" type="screen4x3"/>
   <p:notesSz cx="7315200" cy="9601200"/>
   <p:custDataLst>
-    <p:tags r:id="rId17"/>
+    <p:tags r:id="rId18"/>
   </p:custDataLst>
   <p:defaultTextStyle>
     <a:defPPr>
@@ -1028,7 +1029,7 @@
             <a:fld id="{E4886CB5-510A-4EF6-9466-BC7A8F0DDE87}" type="datetime1">
               <a:rPr lang="en-US" smtClean="0"/>
               <a:pPr/>
-              <a:t>3/17/21</a:t>
+              <a:t>3/24/21</a:t>
             </a:fld>
             <a:endParaRPr lang="en-US"/>
           </a:p>
@@ -1388,7 +1389,7 @@
             <a:fld id="{9B297853-24B4-4D05-83E4-0AD2E86C55E5}" type="datetime1">
               <a:rPr lang="en-US" smtClean="0"/>
               <a:pPr/>
-              <a:t>3/17/21</a:t>
+              <a:t>3/24/21</a:t>
             </a:fld>
             <a:endParaRPr lang="en-US"/>
           </a:p>
@@ -1564,7 +1565,7 @@
             <a:fld id="{01FCDD9E-5768-4705-9537-0C020B1BB310}" type="datetime1">
               <a:rPr lang="en-US" smtClean="0"/>
               <a:pPr/>
-              <a:t>3/17/21</a:t>
+              <a:t>3/24/21</a:t>
             </a:fld>
             <a:endParaRPr lang="en-US"/>
           </a:p>
@@ -1800,7 +1801,7 @@
             <a:fld id="{4257C27E-59C2-41CA-9776-94955CBEE440}" type="datetime1">
               <a:rPr lang="en-US" smtClean="0"/>
               <a:pPr/>
-              <a:t>3/17/21</a:t>
+              <a:t>3/24/21</a:t>
             </a:fld>
             <a:endParaRPr lang="en-US"/>
           </a:p>
@@ -2086,7 +2087,7 @@
             <a:fld id="{03180747-A137-49C6-9C74-AB7EE86F4904}" type="datetime1">
               <a:rPr lang="en-US" smtClean="0"/>
               <a:pPr/>
-              <a:t>3/17/21</a:t>
+              <a:t>3/24/21</a:t>
             </a:fld>
             <a:endParaRPr lang="en-US"/>
           </a:p>
@@ -2307,7 +2308,7 @@
             <a:fld id="{EBBA31D9-ADC1-480D-86A8-1EAFB6A86A35}" type="datetime1">
               <a:rPr lang="en-US" smtClean="0"/>
               <a:pPr/>
-              <a:t>3/17/21</a:t>
+              <a:t>3/24/21</a:t>
             </a:fld>
             <a:endParaRPr lang="en-US"/>
           </a:p>
@@ -2660,7 +2661,7 @@
             <a:fld id="{80AAE9AE-3B2F-4DEA-8C41-BDDF4CDF6F40}" type="datetime1">
               <a:rPr lang="en-US" smtClean="0"/>
               <a:pPr/>
-              <a:t>3/17/21</a:t>
+              <a:t>3/24/21</a:t>
             </a:fld>
             <a:endParaRPr lang="en-US"/>
           </a:p>
@@ -2893,7 +2894,7 @@
             <a:fld id="{48252F7F-E8FE-413B-8521-D4ED924C6DE5}" type="datetime1">
               <a:rPr lang="en-US" smtClean="0"/>
               <a:pPr/>
-              <a:t>3/17/21</a:t>
+              <a:t>3/24/21</a:t>
             </a:fld>
             <a:endParaRPr lang="en-US"/>
           </a:p>
@@ -3035,7 +3036,7 @@
             <a:fld id="{2FF1B124-70E3-4E4A-90E2-6B55DB7659B3}" type="datetime1">
               <a:rPr lang="en-US" smtClean="0"/>
               <a:pPr/>
-              <a:t>3/17/21</a:t>
+              <a:t>3/24/21</a:t>
             </a:fld>
             <a:endParaRPr lang="en-US"/>
           </a:p>
@@ -3313,7 +3314,7 @@
             <a:fld id="{4EBF4C98-3CD6-4C87-BD40-5718C2628835}" type="datetime1">
               <a:rPr lang="en-US" smtClean="0"/>
               <a:pPr/>
-              <a:t>3/17/21</a:t>
+              <a:t>3/24/21</a:t>
             </a:fld>
             <a:endParaRPr lang="en-US"/>
           </a:p>
@@ -3721,7 +3722,7 @@
             <a:fld id="{6D6408A8-6B1B-4CDA-875E-7BEECDBA31DF}" type="datetime1">
               <a:rPr lang="en-US" smtClean="0"/>
               <a:pPr/>
-              <a:t>3/17/21</a:t>
+              <a:t>3/24/21</a:t>
             </a:fld>
             <a:endParaRPr lang="en-US"/>
           </a:p>
@@ -4059,7 +4060,7 @@
             <a:fld id="{C55AAF07-D2F5-4B3C-B443-40DE8C337A77}" type="datetime1">
               <a:rPr lang="en-US" smtClean="0"/>
               <a:pPr/>
-              <a:t>3/17/21</a:t>
+              <a:t>3/24/21</a:t>
             </a:fld>
             <a:endParaRPr lang="en-US"/>
           </a:p>
@@ -5469,6 +5470,173 @@
 </p:sld>
 </file>
 
+<file path=ppt/slides/slide14.xml><?xml version="1.0" encoding="utf-8"?>
+<p:sld xmlns:a="http://schemas.openxmlformats.org/drawingml/2006/main" xmlns:r="http://schemas.openxmlformats.org/officeDocument/2006/relationships" xmlns:p="http://schemas.openxmlformats.org/presentationml/2006/main">
+  <p:cSld>
+    <p:spTree>
+      <p:nvGrpSpPr>
+        <p:cNvPr id="1" name=""/>
+        <p:cNvGrpSpPr/>
+        <p:nvPr/>
+      </p:nvGrpSpPr>
+      <p:grpSpPr>
+        <a:xfrm>
+          <a:off x="0" y="0"/>
+          <a:ext cx="0" cy="0"/>
+          <a:chOff x="0" y="0"/>
+          <a:chExt cx="0" cy="0"/>
+        </a:xfrm>
+      </p:grpSpPr>
+      <p:sp>
+        <p:nvSpPr>
+          <p:cNvPr id="6146" name="Rectangle 2"/>
+          <p:cNvSpPr>
+            <a:spLocks noGrp="1" noChangeArrowheads="1"/>
+          </p:cNvSpPr>
+          <p:nvPr>
+            <p:ph type="title"/>
+            <p:custDataLst>
+              <p:tags r:id="rId1"/>
+            </p:custDataLst>
+          </p:nvPr>
+        </p:nvSpPr>
+        <p:spPr/>
+        <p:txBody>
+          <a:bodyPr/>
+          <a:lstStyle/>
+          <a:p>
+            <a:r>
+              <a:rPr lang="en-US" dirty="0"/>
+              <a:t>Wednesday, Mar. 24</a:t>
+            </a:r>
+          </a:p>
+        </p:txBody>
+      </p:sp>
+      <p:sp>
+        <p:nvSpPr>
+          <p:cNvPr id="6147" name="Rectangle 3"/>
+          <p:cNvSpPr>
+            <a:spLocks noGrp="1" noChangeArrowheads="1"/>
+          </p:cNvSpPr>
+          <p:nvPr>
+            <p:ph sz="quarter" idx="1"/>
+            <p:custDataLst>
+              <p:tags r:id="rId2"/>
+            </p:custDataLst>
+          </p:nvPr>
+        </p:nvSpPr>
+        <p:spPr>
+          <a:xfrm>
+            <a:off x="381000" y="1371600"/>
+            <a:ext cx="8255000" cy="5105400"/>
+          </a:xfrm>
+        </p:spPr>
+        <p:txBody>
+          <a:bodyPr>
+            <a:normAutofit/>
+          </a:bodyPr>
+          <a:lstStyle/>
+          <a:p>
+            <a:r>
+              <a:rPr lang="en-US" dirty="0"/>
+              <a:t>Quiz 2 is Friday – Saturday</a:t>
+            </a:r>
+          </a:p>
+          <a:p>
+            <a:pPr lvl="1"/>
+            <a:r>
+              <a:rPr lang="en-US" dirty="0"/>
+              <a:t>We might try using </a:t>
+            </a:r>
+            <a:r>
+              <a:rPr lang="en-US" dirty="0" err="1"/>
+              <a:t>Gradescope</a:t>
+            </a:r>
+            <a:r>
+              <a:rPr lang="en-US" dirty="0"/>
+              <a:t> this time. Seems easier in some ways. Announcement soon! Otherwise, same as last time.</a:t>
+            </a:r>
+          </a:p>
+          <a:p>
+            <a:r>
+              <a:rPr lang="en-US" dirty="0"/>
+              <a:t>Recommended schedule up on schedule page of website. </a:t>
+            </a:r>
+          </a:p>
+          <a:p>
+            <a:pPr lvl="1"/>
+            <a:r>
+              <a:rPr lang="en-US" dirty="0"/>
+              <a:t>Good luck, I know module 2 is a little “scrunched”</a:t>
+            </a:r>
+          </a:p>
+          <a:p>
+            <a:r>
+              <a:rPr lang="en-US" dirty="0"/>
+              <a:t>Soft deadline for module 2 has passed.</a:t>
+            </a:r>
+          </a:p>
+          <a:p>
+            <a:pPr lvl="1"/>
+            <a:r>
+              <a:rPr lang="en-US" dirty="0"/>
+              <a:t>We are crunching through grading now</a:t>
+            </a:r>
+          </a:p>
+          <a:p>
+            <a:r>
+              <a:rPr lang="en-US" dirty="0"/>
+              <a:t>New grading scheme. Any questions?</a:t>
+            </a:r>
+          </a:p>
+          <a:p>
+            <a:endParaRPr lang="en-US" dirty="0"/>
+          </a:p>
+          <a:p>
+            <a:r>
+              <a:rPr lang="en-US" dirty="0"/>
+              <a:t>Today we will discuss knapsack w/ example</a:t>
+            </a:r>
+          </a:p>
+        </p:txBody>
+      </p:sp>
+      <p:sp>
+        <p:nvSpPr>
+          <p:cNvPr id="4" name="Slide Number Placeholder 3"/>
+          <p:cNvSpPr>
+            <a:spLocks noGrp="1"/>
+          </p:cNvSpPr>
+          <p:nvPr>
+            <p:ph type="sldNum" sz="quarter" idx="12"/>
+          </p:nvPr>
+        </p:nvSpPr>
+        <p:spPr/>
+        <p:txBody>
+          <a:bodyPr/>
+          <a:lstStyle/>
+          <a:p>
+            <a:fld id="{F26D9103-0C5C-48AC-B68E-3ED2C1647047}" type="slidenum">
+              <a:rPr lang="en-US" smtClean="0"/>
+              <a:pPr/>
+              <a:t>14</a:t>
+            </a:fld>
+            <a:endParaRPr lang="en-US" dirty="0"/>
+          </a:p>
+        </p:txBody>
+      </p:sp>
+    </p:spTree>
+    <p:extLst>
+      <p:ext uri="{BB962C8B-B14F-4D97-AF65-F5344CB8AC3E}">
+        <p14:creationId xmlns:p14="http://schemas.microsoft.com/office/powerpoint/2010/main" val="1456159628"/>
+      </p:ext>
+    </p:extLst>
+  </p:cSld>
+  <p:clrMapOvr>
+    <a:masterClrMapping/>
+  </p:clrMapOvr>
+</p:sld>
+</file>
+
 <file path=ppt/slides/slide2.xml><?xml version="1.0" encoding="utf-8"?>
 <p:sld xmlns:a="http://schemas.openxmlformats.org/drawingml/2006/main" xmlns:r="http://schemas.openxmlformats.org/officeDocument/2006/relationships" xmlns:p="http://schemas.openxmlformats.org/presentationml/2006/main">
   <p:cSld>
@@ -6919,6 +7087,18 @@
 </file>
 
 <file path=ppt/tags/tag23.xml><?xml version="1.0" encoding="utf-8"?>
+<p:tagLst xmlns:a="http://schemas.openxmlformats.org/drawingml/2006/main" xmlns:r="http://schemas.openxmlformats.org/officeDocument/2006/relationships" xmlns:p="http://schemas.openxmlformats.org/presentationml/2006/main">
+  <p:tag name="_INSTRUCTOR VIEW19C14C36-AC8E-43BC-9DB6-C2AAF774C7DC|PANE__TAG" val="_"/>
+</p:tagLst>
+</file>
+
+<file path=ppt/tags/tag24.xml><?xml version="1.0" encoding="utf-8"?>
+<p:tagLst xmlns:a="http://schemas.openxmlformats.org/drawingml/2006/main" xmlns:r="http://schemas.openxmlformats.org/officeDocument/2006/relationships" xmlns:p="http://schemas.openxmlformats.org/presentationml/2006/main">
+  <p:tag name="_INSTRUCTOR VIEW19C14C36-AC8E-43BC-9DB6-C2AAF774C7DC|PANE__TAG" val="_"/>
+</p:tagLst>
+</file>
+
+<file path=ppt/tags/tag25.xml><?xml version="1.0" encoding="utf-8"?>
 <p:tagLst xmlns:a="http://schemas.openxmlformats.org/drawingml/2006/main" xmlns:r="http://schemas.openxmlformats.org/officeDocument/2006/relationships" xmlns:p="http://schemas.openxmlformats.org/presentationml/2006/main">
   <p:tag name="_INSTRUCTOR VIEW19C14C36-AC8E-43BC-9DB6-C2AAF774C7DC|PANE__TAG" val="_"/>
 </p:tagLst>

</xml_diff>

<commit_message>
slides and module 4 hw
</commit_message>
<xml_diff>
--- a/slides/dailyannouncements_mf.pptx
+++ b/slides/dailyannouncements_mf.pptx
@@ -5,10 +5,10 @@
     <p:sldMasterId id="2147483728" r:id="rId1"/>
   </p:sldMasterIdLst>
   <p:notesMasterIdLst>
-    <p:notesMasterId r:id="rId18"/>
+    <p:notesMasterId r:id="rId21"/>
   </p:notesMasterIdLst>
   <p:handoutMasterIdLst>
-    <p:handoutMasterId r:id="rId19"/>
+    <p:handoutMasterId r:id="rId22"/>
   </p:handoutMasterIdLst>
   <p:sldIdLst>
     <p:sldId id="447" r:id="rId2"/>
@@ -27,11 +27,14 @@
     <p:sldId id="495" r:id="rId15"/>
     <p:sldId id="496" r:id="rId16"/>
     <p:sldId id="497" r:id="rId17"/>
+    <p:sldId id="498" r:id="rId18"/>
+    <p:sldId id="499" r:id="rId19"/>
+    <p:sldId id="500" r:id="rId20"/>
   </p:sldIdLst>
   <p:sldSz cx="9144000" cy="6858000" type="screen4x3"/>
   <p:notesSz cx="7315200" cy="9601200"/>
   <p:custDataLst>
-    <p:tags r:id="rId20"/>
+    <p:tags r:id="rId23"/>
   </p:custDataLst>
   <p:defaultTextStyle>
     <a:defPPr>
@@ -1031,7 +1034,7 @@
             <a:fld id="{E4886CB5-510A-4EF6-9466-BC7A8F0DDE87}" type="datetime1">
               <a:rPr lang="en-US" smtClean="0"/>
               <a:pPr/>
-              <a:t>4/7/21</a:t>
+              <a:t>4/19/21</a:t>
             </a:fld>
             <a:endParaRPr lang="en-US"/>
           </a:p>
@@ -1391,7 +1394,7 @@
             <a:fld id="{9B297853-24B4-4D05-83E4-0AD2E86C55E5}" type="datetime1">
               <a:rPr lang="en-US" smtClean="0"/>
               <a:pPr/>
-              <a:t>4/7/21</a:t>
+              <a:t>4/19/21</a:t>
             </a:fld>
             <a:endParaRPr lang="en-US"/>
           </a:p>
@@ -1567,7 +1570,7 @@
             <a:fld id="{01FCDD9E-5768-4705-9537-0C020B1BB310}" type="datetime1">
               <a:rPr lang="en-US" smtClean="0"/>
               <a:pPr/>
-              <a:t>4/7/21</a:t>
+              <a:t>4/19/21</a:t>
             </a:fld>
             <a:endParaRPr lang="en-US"/>
           </a:p>
@@ -1803,7 +1806,7 @@
             <a:fld id="{4257C27E-59C2-41CA-9776-94955CBEE440}" type="datetime1">
               <a:rPr lang="en-US" smtClean="0"/>
               <a:pPr/>
-              <a:t>4/7/21</a:t>
+              <a:t>4/19/21</a:t>
             </a:fld>
             <a:endParaRPr lang="en-US"/>
           </a:p>
@@ -2089,7 +2092,7 @@
             <a:fld id="{03180747-A137-49C6-9C74-AB7EE86F4904}" type="datetime1">
               <a:rPr lang="en-US" smtClean="0"/>
               <a:pPr/>
-              <a:t>4/7/21</a:t>
+              <a:t>4/19/21</a:t>
             </a:fld>
             <a:endParaRPr lang="en-US"/>
           </a:p>
@@ -2310,7 +2313,7 @@
             <a:fld id="{EBBA31D9-ADC1-480D-86A8-1EAFB6A86A35}" type="datetime1">
               <a:rPr lang="en-US" smtClean="0"/>
               <a:pPr/>
-              <a:t>4/7/21</a:t>
+              <a:t>4/19/21</a:t>
             </a:fld>
             <a:endParaRPr lang="en-US"/>
           </a:p>
@@ -2663,7 +2666,7 @@
             <a:fld id="{80AAE9AE-3B2F-4DEA-8C41-BDDF4CDF6F40}" type="datetime1">
               <a:rPr lang="en-US" smtClean="0"/>
               <a:pPr/>
-              <a:t>4/7/21</a:t>
+              <a:t>4/19/21</a:t>
             </a:fld>
             <a:endParaRPr lang="en-US"/>
           </a:p>
@@ -2896,7 +2899,7 @@
             <a:fld id="{48252F7F-E8FE-413B-8521-D4ED924C6DE5}" type="datetime1">
               <a:rPr lang="en-US" smtClean="0"/>
               <a:pPr/>
-              <a:t>4/7/21</a:t>
+              <a:t>4/19/21</a:t>
             </a:fld>
             <a:endParaRPr lang="en-US"/>
           </a:p>
@@ -3038,7 +3041,7 @@
             <a:fld id="{2FF1B124-70E3-4E4A-90E2-6B55DB7659B3}" type="datetime1">
               <a:rPr lang="en-US" smtClean="0"/>
               <a:pPr/>
-              <a:t>4/7/21</a:t>
+              <a:t>4/19/21</a:t>
             </a:fld>
             <a:endParaRPr lang="en-US"/>
           </a:p>
@@ -3316,7 +3319,7 @@
             <a:fld id="{4EBF4C98-3CD6-4C87-BD40-5718C2628835}" type="datetime1">
               <a:rPr lang="en-US" smtClean="0"/>
               <a:pPr/>
-              <a:t>4/7/21</a:t>
+              <a:t>4/19/21</a:t>
             </a:fld>
             <a:endParaRPr lang="en-US"/>
           </a:p>
@@ -3724,7 +3727,7 @@
             <a:fld id="{6D6408A8-6B1B-4CDA-875E-7BEECDBA31DF}" type="datetime1">
               <a:rPr lang="en-US" smtClean="0"/>
               <a:pPr/>
-              <a:t>4/7/21</a:t>
+              <a:t>4/19/21</a:t>
             </a:fld>
             <a:endParaRPr lang="en-US"/>
           </a:p>
@@ -4062,7 +4065,7 @@
             <a:fld id="{C55AAF07-D2F5-4B3C-B443-40DE8C337A77}" type="datetime1">
               <a:rPr lang="en-US" smtClean="0"/>
               <a:pPr/>
-              <a:t>4/7/21</a:t>
+              <a:t>4/19/21</a:t>
             </a:fld>
             <a:endParaRPr lang="en-US"/>
           </a:p>
@@ -5976,6 +5979,519 @@
 </p:sld>
 </file>
 
+<file path=ppt/slides/slide17.xml><?xml version="1.0" encoding="utf-8"?>
+<p:sld xmlns:a="http://schemas.openxmlformats.org/drawingml/2006/main" xmlns:r="http://schemas.openxmlformats.org/officeDocument/2006/relationships" xmlns:p="http://schemas.openxmlformats.org/presentationml/2006/main">
+  <p:cSld>
+    <p:spTree>
+      <p:nvGrpSpPr>
+        <p:cNvPr id="1" name=""/>
+        <p:cNvGrpSpPr/>
+        <p:nvPr/>
+      </p:nvGrpSpPr>
+      <p:grpSpPr>
+        <a:xfrm>
+          <a:off x="0" y="0"/>
+          <a:ext cx="0" cy="0"/>
+          <a:chOff x="0" y="0"/>
+          <a:chExt cx="0" cy="0"/>
+        </a:xfrm>
+      </p:grpSpPr>
+      <p:sp>
+        <p:nvSpPr>
+          <p:cNvPr id="6146" name="Rectangle 2"/>
+          <p:cNvSpPr>
+            <a:spLocks noGrp="1" noChangeArrowheads="1"/>
+          </p:cNvSpPr>
+          <p:nvPr>
+            <p:ph type="title"/>
+            <p:custDataLst>
+              <p:tags r:id="rId1"/>
+            </p:custDataLst>
+          </p:nvPr>
+        </p:nvSpPr>
+        <p:spPr/>
+        <p:txBody>
+          <a:bodyPr/>
+          <a:lstStyle/>
+          <a:p>
+            <a:r>
+              <a:rPr lang="en-US" dirty="0"/>
+              <a:t>Wednesday, Apr. 12</a:t>
+            </a:r>
+          </a:p>
+        </p:txBody>
+      </p:sp>
+      <p:sp>
+        <p:nvSpPr>
+          <p:cNvPr id="6147" name="Rectangle 3"/>
+          <p:cNvSpPr>
+            <a:spLocks noGrp="1" noChangeArrowheads="1"/>
+          </p:cNvSpPr>
+          <p:nvPr>
+            <p:ph sz="quarter" idx="1"/>
+            <p:custDataLst>
+              <p:tags r:id="rId2"/>
+            </p:custDataLst>
+          </p:nvPr>
+        </p:nvSpPr>
+        <p:spPr>
+          <a:xfrm>
+            <a:off x="381000" y="1371600"/>
+            <a:ext cx="8255000" cy="5105400"/>
+          </a:xfrm>
+        </p:spPr>
+        <p:txBody>
+          <a:bodyPr>
+            <a:normAutofit lnSpcReduction="10000"/>
+          </a:bodyPr>
+          <a:lstStyle/>
+          <a:p>
+            <a:r>
+              <a:rPr lang="en-US" dirty="0"/>
+              <a:t>Quiz 2 and retake Quiz 1 is done</a:t>
+            </a:r>
+          </a:p>
+          <a:p>
+            <a:pPr lvl="1"/>
+            <a:r>
+              <a:rPr lang="en-US" dirty="0"/>
+              <a:t>60% for satisfied, 70% for mastery</a:t>
+            </a:r>
+          </a:p>
+          <a:p>
+            <a:pPr lvl="1"/>
+            <a:r>
+              <a:rPr lang="en-US" dirty="0"/>
+              <a:t>Hope that went ok!</a:t>
+            </a:r>
+          </a:p>
+          <a:p>
+            <a:r>
+              <a:rPr lang="en-US" dirty="0"/>
+              <a:t>Grading for module 2 is done (except for a handful of advanced written </a:t>
+            </a:r>
+            <a:r>
+              <a:rPr lang="en-US" dirty="0" err="1"/>
+              <a:t>hws</a:t>
+            </a:r>
+            <a:r>
+              <a:rPr lang="en-US" dirty="0"/>
+              <a:t>).</a:t>
+            </a:r>
+          </a:p>
+          <a:p>
+            <a:r>
+              <a:rPr lang="en-US" dirty="0"/>
+              <a:t>Recommended schedule up on schedule page of website. </a:t>
+            </a:r>
+          </a:p>
+          <a:p>
+            <a:pPr lvl="1"/>
+            <a:r>
+              <a:rPr lang="en-US" dirty="0"/>
+              <a:t>Recommended to do one of the module 3 basics this week.</a:t>
+            </a:r>
+          </a:p>
+          <a:p>
+            <a:pPr lvl="1"/>
+            <a:r>
+              <a:rPr lang="en-US" dirty="0"/>
+              <a:t>You have everything you need to do the homework, but remember that adv. programming is HARD</a:t>
+            </a:r>
+          </a:p>
+          <a:p>
+            <a:r>
+              <a:rPr lang="en-US" dirty="0"/>
+              <a:t>Module 3 soft deadline is Wednesday.</a:t>
+            </a:r>
+          </a:p>
+          <a:p>
+            <a:endParaRPr lang="en-US" dirty="0"/>
+          </a:p>
+          <a:p>
+            <a:r>
+              <a:rPr lang="en-US" dirty="0"/>
+              <a:t>Today we will discuss LCS</a:t>
+            </a:r>
+          </a:p>
+        </p:txBody>
+      </p:sp>
+      <p:sp>
+        <p:nvSpPr>
+          <p:cNvPr id="4" name="Slide Number Placeholder 3"/>
+          <p:cNvSpPr>
+            <a:spLocks noGrp="1"/>
+          </p:cNvSpPr>
+          <p:nvPr>
+            <p:ph type="sldNum" sz="quarter" idx="12"/>
+          </p:nvPr>
+        </p:nvSpPr>
+        <p:spPr/>
+        <p:txBody>
+          <a:bodyPr/>
+          <a:lstStyle/>
+          <a:p>
+            <a:fld id="{F26D9103-0C5C-48AC-B68E-3ED2C1647047}" type="slidenum">
+              <a:rPr lang="en-US" smtClean="0"/>
+              <a:pPr/>
+              <a:t>17</a:t>
+            </a:fld>
+            <a:endParaRPr lang="en-US" dirty="0"/>
+          </a:p>
+        </p:txBody>
+      </p:sp>
+    </p:spTree>
+    <p:extLst>
+      <p:ext uri="{BB962C8B-B14F-4D97-AF65-F5344CB8AC3E}">
+        <p14:creationId xmlns:p14="http://schemas.microsoft.com/office/powerpoint/2010/main" val="2596995109"/>
+      </p:ext>
+    </p:extLst>
+  </p:cSld>
+  <p:clrMapOvr>
+    <a:masterClrMapping/>
+  </p:clrMapOvr>
+</p:sld>
+</file>
+
+<file path=ppt/slides/slide18.xml><?xml version="1.0" encoding="utf-8"?>
+<p:sld xmlns:a="http://schemas.openxmlformats.org/drawingml/2006/main" xmlns:r="http://schemas.openxmlformats.org/officeDocument/2006/relationships" xmlns:p="http://schemas.openxmlformats.org/presentationml/2006/main">
+  <p:cSld>
+    <p:spTree>
+      <p:nvGrpSpPr>
+        <p:cNvPr id="1" name=""/>
+        <p:cNvGrpSpPr/>
+        <p:nvPr/>
+      </p:nvGrpSpPr>
+      <p:grpSpPr>
+        <a:xfrm>
+          <a:off x="0" y="0"/>
+          <a:ext cx="0" cy="0"/>
+          <a:chOff x="0" y="0"/>
+          <a:chExt cx="0" cy="0"/>
+        </a:xfrm>
+      </p:grpSpPr>
+      <p:sp>
+        <p:nvSpPr>
+          <p:cNvPr id="6146" name="Rectangle 2"/>
+          <p:cNvSpPr>
+            <a:spLocks noGrp="1" noChangeArrowheads="1"/>
+          </p:cNvSpPr>
+          <p:nvPr>
+            <p:ph type="title"/>
+            <p:custDataLst>
+              <p:tags r:id="rId1"/>
+            </p:custDataLst>
+          </p:nvPr>
+        </p:nvSpPr>
+        <p:spPr/>
+        <p:txBody>
+          <a:bodyPr/>
+          <a:lstStyle/>
+          <a:p>
+            <a:r>
+              <a:rPr lang="en-US" dirty="0"/>
+              <a:t>Wednesday, Apr. 14</a:t>
+            </a:r>
+          </a:p>
+        </p:txBody>
+      </p:sp>
+      <p:sp>
+        <p:nvSpPr>
+          <p:cNvPr id="6147" name="Rectangle 3"/>
+          <p:cNvSpPr>
+            <a:spLocks noGrp="1" noChangeArrowheads="1"/>
+          </p:cNvSpPr>
+          <p:nvPr>
+            <p:ph sz="quarter" idx="1"/>
+            <p:custDataLst>
+              <p:tags r:id="rId2"/>
+            </p:custDataLst>
+          </p:nvPr>
+        </p:nvSpPr>
+        <p:spPr>
+          <a:xfrm>
+            <a:off x="381000" y="1371600"/>
+            <a:ext cx="8255000" cy="5105400"/>
+          </a:xfrm>
+        </p:spPr>
+        <p:txBody>
+          <a:bodyPr>
+            <a:normAutofit lnSpcReduction="10000"/>
+          </a:bodyPr>
+          <a:lstStyle/>
+          <a:p>
+            <a:r>
+              <a:rPr lang="en-US" dirty="0"/>
+              <a:t>Quiz 2 and retake Quiz 1 is done</a:t>
+            </a:r>
+          </a:p>
+          <a:p>
+            <a:pPr lvl="1"/>
+            <a:r>
+              <a:rPr lang="en-US" dirty="0"/>
+              <a:t>60% for satisfied, 70% for mastery</a:t>
+            </a:r>
+          </a:p>
+          <a:p>
+            <a:pPr lvl="1"/>
+            <a:r>
+              <a:rPr lang="en-US" dirty="0"/>
+              <a:t>Hope that went ok!</a:t>
+            </a:r>
+          </a:p>
+          <a:p>
+            <a:r>
+              <a:rPr lang="en-US" dirty="0"/>
+              <a:t>Grading for module 2 is done</a:t>
+            </a:r>
+          </a:p>
+          <a:p>
+            <a:r>
+              <a:rPr lang="en-US" dirty="0"/>
+              <a:t>Recommended schedule up on schedule page of website. </a:t>
+            </a:r>
+          </a:p>
+          <a:p>
+            <a:pPr lvl="1"/>
+            <a:r>
+              <a:rPr lang="en-US" dirty="0"/>
+              <a:t>Recommended to do one of the module 3 basics this week.</a:t>
+            </a:r>
+          </a:p>
+          <a:p>
+            <a:pPr lvl="1"/>
+            <a:r>
+              <a:rPr lang="en-US" dirty="0"/>
+              <a:t>You have everything you need to do the homework, but remember that adv. programming is HARD</a:t>
+            </a:r>
+          </a:p>
+          <a:p>
+            <a:r>
+              <a:rPr lang="en-US" dirty="0"/>
+              <a:t>Module 3 soft deadline is tonight!.</a:t>
+            </a:r>
+          </a:p>
+          <a:p>
+            <a:pPr lvl="1"/>
+            <a:r>
+              <a:rPr lang="en-US" dirty="0"/>
+              <a:t>Good luck</a:t>
+            </a:r>
+          </a:p>
+          <a:p>
+            <a:r>
+              <a:rPr lang="en-US" dirty="0"/>
+              <a:t>Last day of module 3 </a:t>
+            </a:r>
+          </a:p>
+          <a:p>
+            <a:r>
+              <a:rPr lang="en-US" dirty="0"/>
+              <a:t>Today we will pseudo-polynomial time / Q&amp;A</a:t>
+            </a:r>
+          </a:p>
+        </p:txBody>
+      </p:sp>
+      <p:sp>
+        <p:nvSpPr>
+          <p:cNvPr id="4" name="Slide Number Placeholder 3"/>
+          <p:cNvSpPr>
+            <a:spLocks noGrp="1"/>
+          </p:cNvSpPr>
+          <p:nvPr>
+            <p:ph type="sldNum" sz="quarter" idx="12"/>
+          </p:nvPr>
+        </p:nvSpPr>
+        <p:spPr/>
+        <p:txBody>
+          <a:bodyPr/>
+          <a:lstStyle/>
+          <a:p>
+            <a:fld id="{F26D9103-0C5C-48AC-B68E-3ED2C1647047}" type="slidenum">
+              <a:rPr lang="en-US" smtClean="0"/>
+              <a:pPr/>
+              <a:t>18</a:t>
+            </a:fld>
+            <a:endParaRPr lang="en-US" dirty="0"/>
+          </a:p>
+        </p:txBody>
+      </p:sp>
+    </p:spTree>
+    <p:extLst>
+      <p:ext uri="{BB962C8B-B14F-4D97-AF65-F5344CB8AC3E}">
+        <p14:creationId xmlns:p14="http://schemas.microsoft.com/office/powerpoint/2010/main" val="610637852"/>
+      </p:ext>
+    </p:extLst>
+  </p:cSld>
+  <p:clrMapOvr>
+    <a:masterClrMapping/>
+  </p:clrMapOvr>
+</p:sld>
+</file>
+
+<file path=ppt/slides/slide19.xml><?xml version="1.0" encoding="utf-8"?>
+<p:sld xmlns:a="http://schemas.openxmlformats.org/drawingml/2006/main" xmlns:r="http://schemas.openxmlformats.org/officeDocument/2006/relationships" xmlns:p="http://schemas.openxmlformats.org/presentationml/2006/main">
+  <p:cSld>
+    <p:spTree>
+      <p:nvGrpSpPr>
+        <p:cNvPr id="1" name=""/>
+        <p:cNvGrpSpPr/>
+        <p:nvPr/>
+      </p:nvGrpSpPr>
+      <p:grpSpPr>
+        <a:xfrm>
+          <a:off x="0" y="0"/>
+          <a:ext cx="0" cy="0"/>
+          <a:chOff x="0" y="0"/>
+          <a:chExt cx="0" cy="0"/>
+        </a:xfrm>
+      </p:grpSpPr>
+      <p:sp>
+        <p:nvSpPr>
+          <p:cNvPr id="6146" name="Rectangle 2"/>
+          <p:cNvSpPr>
+            <a:spLocks noGrp="1" noChangeArrowheads="1"/>
+          </p:cNvSpPr>
+          <p:nvPr>
+            <p:ph type="title"/>
+            <p:custDataLst>
+              <p:tags r:id="rId1"/>
+            </p:custDataLst>
+          </p:nvPr>
+        </p:nvSpPr>
+        <p:spPr/>
+        <p:txBody>
+          <a:bodyPr/>
+          <a:lstStyle/>
+          <a:p>
+            <a:r>
+              <a:rPr lang="en-US" dirty="0"/>
+              <a:t>Monday, Apr. 19</a:t>
+            </a:r>
+          </a:p>
+        </p:txBody>
+      </p:sp>
+      <p:sp>
+        <p:nvSpPr>
+          <p:cNvPr id="6147" name="Rectangle 3"/>
+          <p:cNvSpPr>
+            <a:spLocks noGrp="1" noChangeArrowheads="1"/>
+          </p:cNvSpPr>
+          <p:nvPr>
+            <p:ph sz="quarter" idx="1"/>
+            <p:custDataLst>
+              <p:tags r:id="rId2"/>
+            </p:custDataLst>
+          </p:nvPr>
+        </p:nvSpPr>
+        <p:spPr>
+          <a:xfrm>
+            <a:off x="381000" y="1371600"/>
+            <a:ext cx="8255000" cy="5105400"/>
+          </a:xfrm>
+        </p:spPr>
+        <p:txBody>
+          <a:bodyPr>
+            <a:normAutofit lnSpcReduction="10000"/>
+          </a:bodyPr>
+          <a:lstStyle/>
+          <a:p>
+            <a:r>
+              <a:rPr lang="en-US" dirty="0"/>
+              <a:t>Quiz 3 (attempt 1) and Quiz 2 (attempt 2) are available end of this week.</a:t>
+            </a:r>
+          </a:p>
+          <a:p>
+            <a:r>
+              <a:rPr lang="en-US" dirty="0"/>
+              <a:t>Module 3 soft deadline grading is underway, should be done before quiz (that is the goal)</a:t>
+            </a:r>
+          </a:p>
+          <a:p>
+            <a:r>
+              <a:rPr lang="en-US" dirty="0"/>
+              <a:t>Recommended schedule up on schedule page of website. </a:t>
+            </a:r>
+          </a:p>
+          <a:p>
+            <a:pPr lvl="1"/>
+            <a:r>
+              <a:rPr lang="en-US" dirty="0"/>
+              <a:t>Recommended you take on one module 3 advanced </a:t>
+            </a:r>
+            <a:r>
+              <a:rPr lang="en-US" dirty="0" err="1"/>
+              <a:t>hw</a:t>
+            </a:r>
+            <a:r>
+              <a:rPr lang="en-US" dirty="0"/>
+              <a:t> this week.</a:t>
+            </a:r>
+          </a:p>
+          <a:p>
+            <a:r>
+              <a:rPr lang="en-US" dirty="0"/>
+              <a:t>Module 4 homework will be posted very soon!</a:t>
+            </a:r>
+          </a:p>
+          <a:p>
+            <a:r>
+              <a:rPr lang="en-US" dirty="0"/>
+              <a:t>We are starting module 4 today…hooray!!</a:t>
+            </a:r>
+          </a:p>
+          <a:p>
+            <a:pPr lvl="1"/>
+            <a:r>
+              <a:rPr lang="en-US" dirty="0"/>
+              <a:t>Module 4 is a little condensed because of end of semester timing. We will do our best to make it a bit easier on you.</a:t>
+            </a:r>
+          </a:p>
+          <a:p>
+            <a:r>
+              <a:rPr lang="en-US" dirty="0"/>
+              <a:t>Today: Ford-Fulkerson and flow networks!!</a:t>
+            </a:r>
+          </a:p>
+        </p:txBody>
+      </p:sp>
+      <p:sp>
+        <p:nvSpPr>
+          <p:cNvPr id="4" name="Slide Number Placeholder 3"/>
+          <p:cNvSpPr>
+            <a:spLocks noGrp="1"/>
+          </p:cNvSpPr>
+          <p:nvPr>
+            <p:ph type="sldNum" sz="quarter" idx="12"/>
+          </p:nvPr>
+        </p:nvSpPr>
+        <p:spPr/>
+        <p:txBody>
+          <a:bodyPr/>
+          <a:lstStyle/>
+          <a:p>
+            <a:fld id="{F26D9103-0C5C-48AC-B68E-3ED2C1647047}" type="slidenum">
+              <a:rPr lang="en-US" smtClean="0"/>
+              <a:pPr/>
+              <a:t>19</a:t>
+            </a:fld>
+            <a:endParaRPr lang="en-US" dirty="0"/>
+          </a:p>
+        </p:txBody>
+      </p:sp>
+    </p:spTree>
+    <p:extLst>
+      <p:ext uri="{BB962C8B-B14F-4D97-AF65-F5344CB8AC3E}">
+        <p14:creationId xmlns:p14="http://schemas.microsoft.com/office/powerpoint/2010/main" val="2816304955"/>
+      </p:ext>
+    </p:extLst>
+  </p:cSld>
+  <p:clrMapOvr>
+    <a:masterClrMapping/>
+  </p:clrMapOvr>
+</p:sld>
+</file>
+
 <file path=ppt/slides/slide2.xml><?xml version="1.0" encoding="utf-8"?>
 <p:sld xmlns:a="http://schemas.openxmlformats.org/drawingml/2006/main" xmlns:r="http://schemas.openxmlformats.org/officeDocument/2006/relationships" xmlns:p="http://schemas.openxmlformats.org/presentationml/2006/main">
   <p:cSld>
@@ -7468,6 +7984,42 @@
 </file>
 
 <file path=ppt/tags/tag3.xml><?xml version="1.0" encoding="utf-8"?>
+<p:tagLst xmlns:a="http://schemas.openxmlformats.org/drawingml/2006/main" xmlns:r="http://schemas.openxmlformats.org/officeDocument/2006/relationships" xmlns:p="http://schemas.openxmlformats.org/presentationml/2006/main">
+  <p:tag name="_INSTRUCTOR VIEW19C14C36-AC8E-43BC-9DB6-C2AAF774C7DC|PANE__TAG" val="_"/>
+</p:tagLst>
+</file>
+
+<file path=ppt/tags/tag30.xml><?xml version="1.0" encoding="utf-8"?>
+<p:tagLst xmlns:a="http://schemas.openxmlformats.org/drawingml/2006/main" xmlns:r="http://schemas.openxmlformats.org/officeDocument/2006/relationships" xmlns:p="http://schemas.openxmlformats.org/presentationml/2006/main">
+  <p:tag name="_INSTRUCTOR VIEW19C14C36-AC8E-43BC-9DB6-C2AAF774C7DC|PANE__TAG" val="_"/>
+</p:tagLst>
+</file>
+
+<file path=ppt/tags/tag31.xml><?xml version="1.0" encoding="utf-8"?>
+<p:tagLst xmlns:a="http://schemas.openxmlformats.org/drawingml/2006/main" xmlns:r="http://schemas.openxmlformats.org/officeDocument/2006/relationships" xmlns:p="http://schemas.openxmlformats.org/presentationml/2006/main">
+  <p:tag name="_INSTRUCTOR VIEW19C14C36-AC8E-43BC-9DB6-C2AAF774C7DC|PANE__TAG" val="_"/>
+</p:tagLst>
+</file>
+
+<file path=ppt/tags/tag32.xml><?xml version="1.0" encoding="utf-8"?>
+<p:tagLst xmlns:a="http://schemas.openxmlformats.org/drawingml/2006/main" xmlns:r="http://schemas.openxmlformats.org/officeDocument/2006/relationships" xmlns:p="http://schemas.openxmlformats.org/presentationml/2006/main">
+  <p:tag name="_INSTRUCTOR VIEW19C14C36-AC8E-43BC-9DB6-C2AAF774C7DC|PANE__TAG" val="_"/>
+</p:tagLst>
+</file>
+
+<file path=ppt/tags/tag33.xml><?xml version="1.0" encoding="utf-8"?>
+<p:tagLst xmlns:a="http://schemas.openxmlformats.org/drawingml/2006/main" xmlns:r="http://schemas.openxmlformats.org/officeDocument/2006/relationships" xmlns:p="http://schemas.openxmlformats.org/presentationml/2006/main">
+  <p:tag name="_INSTRUCTOR VIEW19C14C36-AC8E-43BC-9DB6-C2AAF774C7DC|PANE__TAG" val="_"/>
+</p:tagLst>
+</file>
+
+<file path=ppt/tags/tag34.xml><?xml version="1.0" encoding="utf-8"?>
+<p:tagLst xmlns:a="http://schemas.openxmlformats.org/drawingml/2006/main" xmlns:r="http://schemas.openxmlformats.org/officeDocument/2006/relationships" xmlns:p="http://schemas.openxmlformats.org/presentationml/2006/main">
+  <p:tag name="_INSTRUCTOR VIEW19C14C36-AC8E-43BC-9DB6-C2AAF774C7DC|PANE__TAG" val="_"/>
+</p:tagLst>
+</file>
+
+<file path=ppt/tags/tag35.xml><?xml version="1.0" encoding="utf-8"?>
 <p:tagLst xmlns:a="http://schemas.openxmlformats.org/drawingml/2006/main" xmlns:r="http://schemas.openxmlformats.org/officeDocument/2006/relationships" xmlns:p="http://schemas.openxmlformats.org/presentationml/2006/main">
   <p:tag name="_INSTRUCTOR VIEW19C14C36-AC8E-43BC-9DB6-C2AAF774C7DC|PANE__TAG" val="_"/>
 </p:tagLst>

</xml_diff>

<commit_message>
discord link to announcements
</commit_message>
<xml_diff>
--- a/slides/dailyannouncements_mf.pptx
+++ b/slides/dailyannouncements_mf.pptx
@@ -4910,7 +4910,24 @@
           <a:p>
             <a:r>
               <a:rPr lang="en-US" dirty="0"/>
-              <a:t>First homework has been released</a:t>
+              <a:t>Join Discord ASAP: </a:t>
+            </a:r>
+            <a:r>
+              <a:rPr lang="en-US" dirty="0">
+                <a:hlinkClick r:id="rId4"/>
+              </a:rPr>
+              <a:t>https://discord.gg/9fzMCVJw</a:t>
+            </a:r>
+            <a:endParaRPr lang="en-US" dirty="0"/>
+          </a:p>
+          <a:p>
+            <a:r>
+              <a:rPr lang="en-US"/>
+              <a:t>First </a:t>
+            </a:r>
+            <a:r>
+              <a:rPr lang="en-US" dirty="0"/>
+              <a:t>homework has been released</a:t>
             </a:r>
           </a:p>
           <a:p>

</xml_diff>

<commit_message>
bfs polish. Announcement slides
</commit_message>
<xml_diff>
--- a/slides/dailyannouncements_mf.pptx
+++ b/slides/dailyannouncements_mf.pptx
@@ -5,10 +5,10 @@
     <p:sldMasterId id="2147483728" r:id="rId1"/>
   </p:sldMasterIdLst>
   <p:notesMasterIdLst>
-    <p:notesMasterId r:id="rId8"/>
+    <p:notesMasterId r:id="rId9"/>
   </p:notesMasterIdLst>
   <p:handoutMasterIdLst>
-    <p:handoutMasterId r:id="rId9"/>
+    <p:handoutMasterId r:id="rId10"/>
   </p:handoutMasterIdLst>
   <p:sldIdLst>
     <p:sldId id="447" r:id="rId2"/>
@@ -17,11 +17,12 @@
     <p:sldId id="485" r:id="rId5"/>
     <p:sldId id="486" r:id="rId6"/>
     <p:sldId id="487" r:id="rId7"/>
+    <p:sldId id="488" r:id="rId8"/>
   </p:sldIdLst>
   <p:sldSz cx="9144000" cy="6858000" type="screen4x3"/>
   <p:notesSz cx="7315200" cy="9601200"/>
   <p:custDataLst>
-    <p:tags r:id="rId10"/>
+    <p:tags r:id="rId11"/>
   </p:custDataLst>
   <p:defaultTextStyle>
     <a:defPPr>
@@ -1021,7 +1022,7 @@
             <a:fld id="{E4886CB5-510A-4EF6-9466-BC7A8F0DDE87}" type="datetime1">
               <a:rPr lang="en-US" smtClean="0"/>
               <a:pPr/>
-              <a:t>9/14/21</a:t>
+              <a:t>9/16/21</a:t>
             </a:fld>
             <a:endParaRPr lang="en-US"/>
           </a:p>
@@ -1381,7 +1382,7 @@
             <a:fld id="{9B297853-24B4-4D05-83E4-0AD2E86C55E5}" type="datetime1">
               <a:rPr lang="en-US" smtClean="0"/>
               <a:pPr/>
-              <a:t>9/14/21</a:t>
+              <a:t>9/16/21</a:t>
             </a:fld>
             <a:endParaRPr lang="en-US"/>
           </a:p>
@@ -1557,7 +1558,7 @@
             <a:fld id="{01FCDD9E-5768-4705-9537-0C020B1BB310}" type="datetime1">
               <a:rPr lang="en-US" smtClean="0"/>
               <a:pPr/>
-              <a:t>9/14/21</a:t>
+              <a:t>9/16/21</a:t>
             </a:fld>
             <a:endParaRPr lang="en-US"/>
           </a:p>
@@ -1793,7 +1794,7 @@
             <a:fld id="{4257C27E-59C2-41CA-9776-94955CBEE440}" type="datetime1">
               <a:rPr lang="en-US" smtClean="0"/>
               <a:pPr/>
-              <a:t>9/14/21</a:t>
+              <a:t>9/16/21</a:t>
             </a:fld>
             <a:endParaRPr lang="en-US"/>
           </a:p>
@@ -2079,7 +2080,7 @@
             <a:fld id="{03180747-A137-49C6-9C74-AB7EE86F4904}" type="datetime1">
               <a:rPr lang="en-US" smtClean="0"/>
               <a:pPr/>
-              <a:t>9/14/21</a:t>
+              <a:t>9/16/21</a:t>
             </a:fld>
             <a:endParaRPr lang="en-US"/>
           </a:p>
@@ -2300,7 +2301,7 @@
             <a:fld id="{EBBA31D9-ADC1-480D-86A8-1EAFB6A86A35}" type="datetime1">
               <a:rPr lang="en-US" smtClean="0"/>
               <a:pPr/>
-              <a:t>9/14/21</a:t>
+              <a:t>9/16/21</a:t>
             </a:fld>
             <a:endParaRPr lang="en-US"/>
           </a:p>
@@ -2653,7 +2654,7 @@
             <a:fld id="{80AAE9AE-3B2F-4DEA-8C41-BDDF4CDF6F40}" type="datetime1">
               <a:rPr lang="en-US" smtClean="0"/>
               <a:pPr/>
-              <a:t>9/14/21</a:t>
+              <a:t>9/16/21</a:t>
             </a:fld>
             <a:endParaRPr lang="en-US"/>
           </a:p>
@@ -2886,7 +2887,7 @@
             <a:fld id="{48252F7F-E8FE-413B-8521-D4ED924C6DE5}" type="datetime1">
               <a:rPr lang="en-US" smtClean="0"/>
               <a:pPr/>
-              <a:t>9/14/21</a:t>
+              <a:t>9/16/21</a:t>
             </a:fld>
             <a:endParaRPr lang="en-US"/>
           </a:p>
@@ -3028,7 +3029,7 @@
             <a:fld id="{2FF1B124-70E3-4E4A-90E2-6B55DB7659B3}" type="datetime1">
               <a:rPr lang="en-US" smtClean="0"/>
               <a:pPr/>
-              <a:t>9/14/21</a:t>
+              <a:t>9/16/21</a:t>
             </a:fld>
             <a:endParaRPr lang="en-US"/>
           </a:p>
@@ -3306,7 +3307,7 @@
             <a:fld id="{4EBF4C98-3CD6-4C87-BD40-5718C2628835}" type="datetime1">
               <a:rPr lang="en-US" smtClean="0"/>
               <a:pPr/>
-              <a:t>9/14/21</a:t>
+              <a:t>9/16/21</a:t>
             </a:fld>
             <a:endParaRPr lang="en-US"/>
           </a:p>
@@ -3714,7 +3715,7 @@
             <a:fld id="{6D6408A8-6B1B-4CDA-875E-7BEECDBA31DF}" type="datetime1">
               <a:rPr lang="en-US" smtClean="0"/>
               <a:pPr/>
-              <a:t>9/14/21</a:t>
+              <a:t>9/16/21</a:t>
             </a:fld>
             <a:endParaRPr lang="en-US"/>
           </a:p>
@@ -4052,7 +4053,7 @@
             <a:fld id="{C55AAF07-D2F5-4B3C-B443-40DE8C337A77}" type="datetime1">
               <a:rPr lang="en-US" smtClean="0"/>
               <a:pPr/>
-              <a:t>9/14/21</a:t>
+              <a:t>9/16/21</a:t>
             </a:fld>
             <a:endParaRPr lang="en-US"/>
           </a:p>
@@ -5525,7 +5526,209 @@
 </p:sld>
 </file>
 
+<file path=ppt/slides/slide7.xml><?xml version="1.0" encoding="utf-8"?>
+<p:sld xmlns:a="http://schemas.openxmlformats.org/drawingml/2006/main" xmlns:r="http://schemas.openxmlformats.org/officeDocument/2006/relationships" xmlns:p="http://schemas.openxmlformats.org/presentationml/2006/main">
+  <p:cSld>
+    <p:spTree>
+      <p:nvGrpSpPr>
+        <p:cNvPr id="1" name=""/>
+        <p:cNvGrpSpPr/>
+        <p:nvPr/>
+      </p:nvGrpSpPr>
+      <p:grpSpPr>
+        <a:xfrm>
+          <a:off x="0" y="0"/>
+          <a:ext cx="0" cy="0"/>
+          <a:chOff x="0" y="0"/>
+          <a:chExt cx="0" cy="0"/>
+        </a:xfrm>
+      </p:grpSpPr>
+      <p:sp>
+        <p:nvSpPr>
+          <p:cNvPr id="6146" name="Rectangle 2"/>
+          <p:cNvSpPr>
+            <a:spLocks noGrp="1" noChangeArrowheads="1"/>
+          </p:cNvSpPr>
+          <p:nvPr>
+            <p:ph type="title"/>
+            <p:custDataLst>
+              <p:tags r:id="rId1"/>
+            </p:custDataLst>
+          </p:nvPr>
+        </p:nvSpPr>
+        <p:spPr/>
+        <p:txBody>
+          <a:bodyPr/>
+          <a:lstStyle/>
+          <a:p>
+            <a:r>
+              <a:rPr lang="en-US" dirty="0"/>
+              <a:t>Thursday, Sep. 16</a:t>
+            </a:r>
+          </a:p>
+        </p:txBody>
+      </p:sp>
+      <p:sp>
+        <p:nvSpPr>
+          <p:cNvPr id="6147" name="Rectangle 3"/>
+          <p:cNvSpPr>
+            <a:spLocks noGrp="1" noChangeArrowheads="1"/>
+          </p:cNvSpPr>
+          <p:nvPr>
+            <p:ph sz="quarter" idx="1"/>
+            <p:custDataLst>
+              <p:tags r:id="rId2"/>
+            </p:custDataLst>
+          </p:nvPr>
+        </p:nvSpPr>
+        <p:spPr>
+          <a:xfrm>
+            <a:off x="381000" y="1371600"/>
+            <a:ext cx="8458200" cy="5105400"/>
+          </a:xfrm>
+        </p:spPr>
+        <p:txBody>
+          <a:bodyPr>
+            <a:normAutofit fontScale="92500" lnSpcReduction="20000"/>
+          </a:bodyPr>
+          <a:lstStyle/>
+          <a:p>
+            <a:r>
+              <a:rPr lang="en-US" dirty="0"/>
+              <a:t>Fill out survey on Discord announcements if you can!!</a:t>
+            </a:r>
+          </a:p>
+          <a:p>
+            <a:r>
+              <a:rPr lang="en-US" dirty="0"/>
+              <a:t>Module 2 HW: Recurrences has been released</a:t>
+            </a:r>
+          </a:p>
+          <a:p>
+            <a:pPr lvl="1"/>
+            <a:r>
+              <a:rPr lang="en-US" dirty="0"/>
+              <a:t>Recommended deadline was Tuesday</a:t>
+            </a:r>
+          </a:p>
+          <a:p>
+            <a:pPr lvl="1"/>
+            <a:r>
+              <a:rPr lang="en-US" dirty="0"/>
+              <a:t>81 submissions so far (yikes!)</a:t>
+            </a:r>
+          </a:p>
+          <a:p>
+            <a:r>
+              <a:rPr lang="en-US" dirty="0"/>
+              <a:t>Those of you who haven’t done module 1 and/or 2 </a:t>
+            </a:r>
+            <a:r>
+              <a:rPr lang="en-US" dirty="0" err="1"/>
+              <a:t>hw</a:t>
+            </a:r>
+            <a:r>
+              <a:rPr lang="en-US" dirty="0"/>
+              <a:t> are BEHIND!</a:t>
+            </a:r>
+          </a:p>
+          <a:p>
+            <a:r>
+              <a:rPr lang="en-US" dirty="0"/>
+              <a:t>Module 3 HW: Trading has also been released</a:t>
+            </a:r>
+          </a:p>
+          <a:p>
+            <a:pPr lvl="1"/>
+            <a:r>
+              <a:rPr lang="en-US" dirty="0"/>
+              <a:t>Recommended deadline is next Tuesday. Start it!!!</a:t>
+            </a:r>
+          </a:p>
+          <a:p>
+            <a:r>
+              <a:rPr lang="en-US" dirty="0"/>
+              <a:t>Any office hours issues? They’ve been surprisingly quiet</a:t>
+            </a:r>
+          </a:p>
+          <a:p>
+            <a:r>
+              <a:rPr lang="en-US" dirty="0"/>
+              <a:t>First round of quizzes is NEXT TUESDAY</a:t>
+            </a:r>
+          </a:p>
+          <a:p>
+            <a:pPr lvl="1"/>
+            <a:r>
+              <a:rPr lang="en-US" dirty="0"/>
+              <a:t>First attempt at modules 1, 2, and 3</a:t>
+            </a:r>
+          </a:p>
+          <a:p>
+            <a:pPr lvl="1"/>
+            <a:r>
+              <a:rPr lang="en-US" dirty="0"/>
+              <a:t>In person, during lecture.</a:t>
+            </a:r>
+          </a:p>
+          <a:p>
+            <a:r>
+              <a:rPr lang="en-US" dirty="0"/>
+              <a:t>Today we are going to do review/Q&amp;A on modules 1-3 if you want, then start BFS (module 4)</a:t>
+            </a:r>
+          </a:p>
+        </p:txBody>
+      </p:sp>
+      <p:sp>
+        <p:nvSpPr>
+          <p:cNvPr id="4" name="Slide Number Placeholder 3"/>
+          <p:cNvSpPr>
+            <a:spLocks noGrp="1"/>
+          </p:cNvSpPr>
+          <p:nvPr>
+            <p:ph type="sldNum" sz="quarter" idx="12"/>
+          </p:nvPr>
+        </p:nvSpPr>
+        <p:spPr/>
+        <p:txBody>
+          <a:bodyPr/>
+          <a:lstStyle/>
+          <a:p>
+            <a:fld id="{F26D9103-0C5C-48AC-B68E-3ED2C1647047}" type="slidenum">
+              <a:rPr lang="en-US" smtClean="0"/>
+              <a:pPr/>
+              <a:t>7</a:t>
+            </a:fld>
+            <a:endParaRPr lang="en-US" dirty="0"/>
+          </a:p>
+        </p:txBody>
+      </p:sp>
+    </p:spTree>
+    <p:extLst>
+      <p:ext uri="{BB962C8B-B14F-4D97-AF65-F5344CB8AC3E}">
+        <p14:creationId xmlns:p14="http://schemas.microsoft.com/office/powerpoint/2010/main" val="2222133522"/>
+      </p:ext>
+    </p:extLst>
+  </p:cSld>
+  <p:clrMapOvr>
+    <a:masterClrMapping/>
+  </p:clrMapOvr>
+</p:sld>
+</file>
+
 <file path=ppt/tags/tag1.xml><?xml version="1.0" encoding="utf-8"?>
+<p:tagLst xmlns:a="http://schemas.openxmlformats.org/drawingml/2006/main" xmlns:r="http://schemas.openxmlformats.org/officeDocument/2006/relationships" xmlns:p="http://schemas.openxmlformats.org/presentationml/2006/main">
+  <p:tag name="_INSTRUCTOR VIEW19C14C36-AC8E-43BC-9DB6-C2AAF774C7DC|PANE__TAG" val="_"/>
+</p:tagLst>
+</file>
+
+<file path=ppt/tags/tag10.xml><?xml version="1.0" encoding="utf-8"?>
+<p:tagLst xmlns:a="http://schemas.openxmlformats.org/drawingml/2006/main" xmlns:r="http://schemas.openxmlformats.org/officeDocument/2006/relationships" xmlns:p="http://schemas.openxmlformats.org/presentationml/2006/main">
+  <p:tag name="_INSTRUCTOR VIEW19C14C36-AC8E-43BC-9DB6-C2AAF774C7DC|PANE__TAG" val="_"/>
+</p:tagLst>
+</file>
+
+<file path=ppt/tags/tag11.xml><?xml version="1.0" encoding="utf-8"?>
 <p:tagLst xmlns:a="http://schemas.openxmlformats.org/drawingml/2006/main" xmlns:r="http://schemas.openxmlformats.org/officeDocument/2006/relationships" xmlns:p="http://schemas.openxmlformats.org/presentationml/2006/main">
   <p:tag name="_INSTRUCTOR VIEW19C14C36-AC8E-43BC-9DB6-C2AAF774C7DC|PANE__TAG" val="_"/>
 </p:tagLst>

</xml_diff>

<commit_message>
added 3 slides to final set and tweaked one more slide
</commit_message>
<xml_diff>
--- a/slides/dailyannouncements_mf.pptx
+++ b/slides/dailyannouncements_mf.pptx
@@ -5,10 +5,10 @@
     <p:sldMasterId id="2147483728" r:id="rId1"/>
   </p:sldMasterIdLst>
   <p:notesMasterIdLst>
-    <p:notesMasterId r:id="rId20"/>
+    <p:notesMasterId r:id="rId21"/>
   </p:notesMasterIdLst>
   <p:handoutMasterIdLst>
-    <p:handoutMasterId r:id="rId21"/>
+    <p:handoutMasterId r:id="rId22"/>
   </p:handoutMasterIdLst>
   <p:sldIdLst>
     <p:sldId id="447" r:id="rId2"/>
@@ -29,11 +29,12 @@
     <p:sldId id="497" r:id="rId17"/>
     <p:sldId id="498" r:id="rId18"/>
     <p:sldId id="499" r:id="rId19"/>
+    <p:sldId id="500" r:id="rId20"/>
   </p:sldIdLst>
   <p:sldSz cx="9144000" cy="6858000" type="screen4x3"/>
   <p:notesSz cx="7315200" cy="9601200"/>
   <p:custDataLst>
-    <p:tags r:id="rId22"/>
+    <p:tags r:id="rId23"/>
   </p:custDataLst>
   <p:defaultTextStyle>
     <a:defPPr>
@@ -1033,7 +1034,7 @@
             <a:fld id="{E4886CB5-510A-4EF6-9466-BC7A8F0DDE87}" type="datetime1">
               <a:rPr lang="en-US" smtClean="0"/>
               <a:pPr/>
-              <a:t>11/18/21</a:t>
+              <a:t>11/30/21</a:t>
             </a:fld>
             <a:endParaRPr lang="en-US"/>
           </a:p>
@@ -1393,7 +1394,7 @@
             <a:fld id="{9B297853-24B4-4D05-83E4-0AD2E86C55E5}" type="datetime1">
               <a:rPr lang="en-US" smtClean="0"/>
               <a:pPr/>
-              <a:t>11/18/21</a:t>
+              <a:t>11/30/21</a:t>
             </a:fld>
             <a:endParaRPr lang="en-US"/>
           </a:p>
@@ -1569,7 +1570,7 @@
             <a:fld id="{01FCDD9E-5768-4705-9537-0C020B1BB310}" type="datetime1">
               <a:rPr lang="en-US" smtClean="0"/>
               <a:pPr/>
-              <a:t>11/18/21</a:t>
+              <a:t>11/30/21</a:t>
             </a:fld>
             <a:endParaRPr lang="en-US"/>
           </a:p>
@@ -1805,7 +1806,7 @@
             <a:fld id="{4257C27E-59C2-41CA-9776-94955CBEE440}" type="datetime1">
               <a:rPr lang="en-US" smtClean="0"/>
               <a:pPr/>
-              <a:t>11/18/21</a:t>
+              <a:t>11/30/21</a:t>
             </a:fld>
             <a:endParaRPr lang="en-US"/>
           </a:p>
@@ -2091,7 +2092,7 @@
             <a:fld id="{03180747-A137-49C6-9C74-AB7EE86F4904}" type="datetime1">
               <a:rPr lang="en-US" smtClean="0"/>
               <a:pPr/>
-              <a:t>11/18/21</a:t>
+              <a:t>11/30/21</a:t>
             </a:fld>
             <a:endParaRPr lang="en-US"/>
           </a:p>
@@ -2312,7 +2313,7 @@
             <a:fld id="{EBBA31D9-ADC1-480D-86A8-1EAFB6A86A35}" type="datetime1">
               <a:rPr lang="en-US" smtClean="0"/>
               <a:pPr/>
-              <a:t>11/18/21</a:t>
+              <a:t>11/30/21</a:t>
             </a:fld>
             <a:endParaRPr lang="en-US"/>
           </a:p>
@@ -2665,7 +2666,7 @@
             <a:fld id="{80AAE9AE-3B2F-4DEA-8C41-BDDF4CDF6F40}" type="datetime1">
               <a:rPr lang="en-US" smtClean="0"/>
               <a:pPr/>
-              <a:t>11/18/21</a:t>
+              <a:t>11/30/21</a:t>
             </a:fld>
             <a:endParaRPr lang="en-US"/>
           </a:p>
@@ -2898,7 +2899,7 @@
             <a:fld id="{48252F7F-E8FE-413B-8521-D4ED924C6DE5}" type="datetime1">
               <a:rPr lang="en-US" smtClean="0"/>
               <a:pPr/>
-              <a:t>11/18/21</a:t>
+              <a:t>11/30/21</a:t>
             </a:fld>
             <a:endParaRPr lang="en-US"/>
           </a:p>
@@ -3040,7 +3041,7 @@
             <a:fld id="{2FF1B124-70E3-4E4A-90E2-6B55DB7659B3}" type="datetime1">
               <a:rPr lang="en-US" smtClean="0"/>
               <a:pPr/>
-              <a:t>11/18/21</a:t>
+              <a:t>11/30/21</a:t>
             </a:fld>
             <a:endParaRPr lang="en-US"/>
           </a:p>
@@ -3318,7 +3319,7 @@
             <a:fld id="{4EBF4C98-3CD6-4C87-BD40-5718C2628835}" type="datetime1">
               <a:rPr lang="en-US" smtClean="0"/>
               <a:pPr/>
-              <a:t>11/18/21</a:t>
+              <a:t>11/30/21</a:t>
             </a:fld>
             <a:endParaRPr lang="en-US"/>
           </a:p>
@@ -3726,7 +3727,7 @@
             <a:fld id="{6D6408A8-6B1B-4CDA-875E-7BEECDBA31DF}" type="datetime1">
               <a:rPr lang="en-US" smtClean="0"/>
               <a:pPr/>
-              <a:t>11/18/21</a:t>
+              <a:t>11/30/21</a:t>
             </a:fld>
             <a:endParaRPr lang="en-US"/>
           </a:p>
@@ -4064,7 +4065,7 @@
             <a:fld id="{C55AAF07-D2F5-4B3C-B443-40DE8C337A77}" type="datetime1">
               <a:rPr lang="en-US" smtClean="0"/>
               <a:pPr/>
-              <a:t>11/18/21</a:t>
+              <a:t>11/30/21</a:t>
             </a:fld>
             <a:endParaRPr lang="en-US"/>
           </a:p>
@@ -6333,6 +6334,273 @@
     <p:extLst>
       <p:ext uri="{BB962C8B-B14F-4D97-AF65-F5344CB8AC3E}">
         <p14:creationId xmlns:p14="http://schemas.microsoft.com/office/powerpoint/2010/main" val="784071872"/>
+      </p:ext>
+    </p:extLst>
+  </p:cSld>
+  <p:clrMapOvr>
+    <a:masterClrMapping/>
+  </p:clrMapOvr>
+</p:sld>
+</file>
+
+<file path=ppt/slides/slide19.xml><?xml version="1.0" encoding="utf-8"?>
+<p:sld xmlns:a="http://schemas.openxmlformats.org/drawingml/2006/main" xmlns:r="http://schemas.openxmlformats.org/officeDocument/2006/relationships" xmlns:p="http://schemas.openxmlformats.org/presentationml/2006/main">
+  <p:cSld>
+    <p:spTree>
+      <p:nvGrpSpPr>
+        <p:cNvPr id="1" name=""/>
+        <p:cNvGrpSpPr/>
+        <p:nvPr/>
+      </p:nvGrpSpPr>
+      <p:grpSpPr>
+        <a:xfrm>
+          <a:off x="0" y="0"/>
+          <a:ext cx="0" cy="0"/>
+          <a:chOff x="0" y="0"/>
+          <a:chExt cx="0" cy="0"/>
+        </a:xfrm>
+      </p:grpSpPr>
+      <p:sp>
+        <p:nvSpPr>
+          <p:cNvPr id="2" name="Title 1">
+            <a:extLst>
+              <a:ext uri="{FF2B5EF4-FFF2-40B4-BE49-F238E27FC236}">
+                <a16:creationId xmlns:a16="http://schemas.microsoft.com/office/drawing/2014/main" id="{A6236176-ED9E-1140-BB1F-01CFA1106CD6}"/>
+              </a:ext>
+            </a:extLst>
+          </p:cNvPr>
+          <p:cNvSpPr>
+            <a:spLocks noGrp="1"/>
+          </p:cNvSpPr>
+          <p:nvPr>
+            <p:ph type="title"/>
+          </p:nvPr>
+        </p:nvSpPr>
+        <p:spPr/>
+        <p:txBody>
+          <a:bodyPr/>
+          <a:lstStyle/>
+          <a:p>
+            <a:r>
+              <a:rPr lang="en-US" dirty="0"/>
+              <a:t>Tuesday, Nov. 30</a:t>
+            </a:r>
+          </a:p>
+        </p:txBody>
+      </p:sp>
+      <p:sp>
+        <p:nvSpPr>
+          <p:cNvPr id="3" name="Slide Number Placeholder 2">
+            <a:extLst>
+              <a:ext uri="{FF2B5EF4-FFF2-40B4-BE49-F238E27FC236}">
+                <a16:creationId xmlns:a16="http://schemas.microsoft.com/office/drawing/2014/main" id="{35663156-E7FA-2E4D-829D-B71962B029D9}"/>
+              </a:ext>
+            </a:extLst>
+          </p:cNvPr>
+          <p:cNvSpPr>
+            <a:spLocks noGrp="1"/>
+          </p:cNvSpPr>
+          <p:nvPr>
+            <p:ph type="sldNum" sz="quarter" idx="12"/>
+          </p:nvPr>
+        </p:nvSpPr>
+        <p:spPr/>
+        <p:txBody>
+          <a:bodyPr/>
+          <a:lstStyle/>
+          <a:p>
+            <a:fld id="{F26D9103-0C5C-48AC-B68E-3ED2C1647047}" type="slidenum">
+              <a:rPr lang="en-US" smtClean="0"/>
+              <a:pPr/>
+              <a:t>19</a:t>
+            </a:fld>
+            <a:endParaRPr lang="en-US"/>
+          </a:p>
+        </p:txBody>
+      </p:sp>
+      <p:sp>
+        <p:nvSpPr>
+          <p:cNvPr id="4" name="Content Placeholder 3">
+            <a:extLst>
+              <a:ext uri="{FF2B5EF4-FFF2-40B4-BE49-F238E27FC236}">
+                <a16:creationId xmlns:a16="http://schemas.microsoft.com/office/drawing/2014/main" id="{9C61322C-EB43-814C-A068-EF963BCE0251}"/>
+              </a:ext>
+            </a:extLst>
+          </p:cNvPr>
+          <p:cNvSpPr>
+            <a:spLocks noGrp="1"/>
+          </p:cNvSpPr>
+          <p:nvPr>
+            <p:ph sz="quarter" idx="1"/>
+          </p:nvPr>
+        </p:nvSpPr>
+        <p:spPr/>
+        <p:txBody>
+          <a:bodyPr>
+            <a:normAutofit fontScale="92500" lnSpcReduction="10000"/>
+          </a:bodyPr>
+          <a:lstStyle/>
+          <a:p>
+            <a:r>
+              <a:rPr lang="en-US" b="1" dirty="0">
+                <a:latin typeface="Arial" panose="020B0604020202020204" pitchFamily="34" charset="0"/>
+                <a:cs typeface="Arial" panose="020B0604020202020204" pitchFamily="34" charset="0"/>
+              </a:rPr>
+              <a:t>Today: </a:t>
+            </a:r>
+            <a:r>
+              <a:rPr lang="en-US" dirty="0">
+                <a:latin typeface="Arial" panose="020B0604020202020204" pitchFamily="34" charset="0"/>
+                <a:cs typeface="Arial" panose="020B0604020202020204" pitchFamily="34" charset="0"/>
+              </a:rPr>
+              <a:t>Last “lecture”:  NP Completeness, final words, quiz topics, etc.</a:t>
+            </a:r>
+          </a:p>
+          <a:p>
+            <a:r>
+              <a:rPr lang="en-US" b="1" dirty="0">
+                <a:latin typeface="Arial" panose="020B0604020202020204" pitchFamily="34" charset="0"/>
+                <a:cs typeface="Arial" panose="020B0604020202020204" pitchFamily="34" charset="0"/>
+              </a:rPr>
+              <a:t>Thur., 12/2</a:t>
+            </a:r>
+            <a:r>
+              <a:rPr lang="en-US" dirty="0">
+                <a:latin typeface="Arial" panose="020B0604020202020204" pitchFamily="34" charset="0"/>
+                <a:cs typeface="Arial" panose="020B0604020202020204" pitchFamily="34" charset="0"/>
+              </a:rPr>
+              <a:t>.  2nd attempt on quizzes for Mods 6, 7 and 8.</a:t>
+            </a:r>
+          </a:p>
+          <a:p>
+            <a:r>
+              <a:rPr lang="en-US" b="1" dirty="0">
+                <a:latin typeface="Arial" panose="020B0604020202020204" pitchFamily="34" charset="0"/>
+                <a:cs typeface="Arial" panose="020B0604020202020204" pitchFamily="34" charset="0"/>
+              </a:rPr>
+              <a:t>Tues., 12/7. </a:t>
+            </a:r>
+            <a:r>
+              <a:rPr lang="en-US" dirty="0">
+                <a:latin typeface="Arial" panose="020B0604020202020204" pitchFamily="34" charset="0"/>
+                <a:cs typeface="Arial" panose="020B0604020202020204" pitchFamily="34" charset="0"/>
+              </a:rPr>
+              <a:t>First attempt on quizzes for Mods  9 and 10</a:t>
+            </a:r>
+          </a:p>
+          <a:p>
+            <a:pPr lvl="1"/>
+            <a:r>
+              <a:rPr lang="en-US" dirty="0">
+                <a:latin typeface="Arial" panose="020B0604020202020204" pitchFamily="34" charset="0"/>
+                <a:cs typeface="Arial" panose="020B0604020202020204" pitchFamily="34" charset="0"/>
+              </a:rPr>
+              <a:t>Topics now posted – see Schedule page for 12/7</a:t>
+            </a:r>
+          </a:p>
+          <a:p>
+            <a:r>
+              <a:rPr lang="en-US" b="1" dirty="0">
+                <a:latin typeface="Arial" panose="020B0604020202020204" pitchFamily="34" charset="0"/>
+                <a:cs typeface="Arial" panose="020B0604020202020204" pitchFamily="34" charset="0"/>
+              </a:rPr>
+              <a:t>Tues., 12/14, 7:00-10:00 PM:</a:t>
+            </a:r>
+            <a:r>
+              <a:rPr lang="en-US" dirty="0">
+                <a:latin typeface="Arial" panose="020B0604020202020204" pitchFamily="34" charset="0"/>
+                <a:cs typeface="Arial" panose="020B0604020202020204" pitchFamily="34" charset="0"/>
+              </a:rPr>
+              <a:t>  Final attempt on any quiz</a:t>
+            </a:r>
+          </a:p>
+          <a:p>
+            <a:pPr lvl="1"/>
+            <a:r>
+              <a:rPr lang="en-US" dirty="0">
+                <a:latin typeface="Arial" panose="020B0604020202020204" pitchFamily="34" charset="0"/>
+                <a:cs typeface="Arial" panose="020B0604020202020204" pitchFamily="34" charset="0"/>
+              </a:rPr>
+              <a:t>Horton's section will be in Clark 107</a:t>
+            </a:r>
+          </a:p>
+          <a:p>
+            <a:pPr lvl="1"/>
+            <a:r>
+              <a:rPr lang="en-US" dirty="0" err="1">
+                <a:latin typeface="Arial" panose="020B0604020202020204" pitchFamily="34" charset="0"/>
+                <a:cs typeface="Arial" panose="020B0604020202020204" pitchFamily="34" charset="0"/>
+              </a:rPr>
+              <a:t>Floryan's</a:t>
+            </a:r>
+            <a:r>
+              <a:rPr lang="en-US" dirty="0">
+                <a:latin typeface="Arial" panose="020B0604020202020204" pitchFamily="34" charset="0"/>
+                <a:cs typeface="Arial" panose="020B0604020202020204" pitchFamily="34" charset="0"/>
+              </a:rPr>
+              <a:t> section will be in Clark 108</a:t>
+            </a:r>
+          </a:p>
+          <a:p>
+            <a:pPr lvl="1"/>
+            <a:r>
+              <a:rPr lang="en-US" dirty="0">
+                <a:latin typeface="Arial" panose="020B0604020202020204" pitchFamily="34" charset="0"/>
+                <a:cs typeface="Arial" panose="020B0604020202020204" pitchFamily="34" charset="0"/>
+              </a:rPr>
+              <a:t>We will post old quizzes before</a:t>
+            </a:r>
+          </a:p>
+          <a:p>
+            <a:r>
+              <a:rPr lang="en-US" dirty="0">
+                <a:latin typeface="Arial" panose="020B0604020202020204" pitchFamily="34" charset="0"/>
+                <a:cs typeface="Arial" panose="020B0604020202020204" pitchFamily="34" charset="0"/>
+              </a:rPr>
+              <a:t>Issues, special accommodations?  Email instructor(s).</a:t>
+            </a:r>
+          </a:p>
+          <a:p>
+            <a:r>
+              <a:rPr lang="en-US" dirty="0">
+                <a:latin typeface="Arial" panose="020B0604020202020204" pitchFamily="34" charset="0"/>
+                <a:cs typeface="Arial" panose="020B0604020202020204" pitchFamily="34" charset="0"/>
+              </a:rPr>
+              <a:t>HW deadline for Mods 7, 8 &amp; 10: </a:t>
+            </a:r>
+            <a:r>
+              <a:rPr lang="en-US" b="1" dirty="0">
+                <a:latin typeface="Arial" panose="020B0604020202020204" pitchFamily="34" charset="0"/>
+                <a:cs typeface="Arial" panose="020B0604020202020204" pitchFamily="34" charset="0"/>
+              </a:rPr>
+              <a:t>Tue., 12/7, 11:59 PM</a:t>
+            </a:r>
+          </a:p>
+          <a:p>
+            <a:r>
+              <a:rPr lang="en-US" dirty="0">
+                <a:latin typeface="Arial" panose="020B0604020202020204" pitchFamily="34" charset="0"/>
+                <a:cs typeface="Arial" panose="020B0604020202020204" pitchFamily="34" charset="0"/>
+              </a:rPr>
+              <a:t>HW deadline for all others:  </a:t>
+            </a:r>
+            <a:r>
+              <a:rPr lang="en-US" b="1" dirty="0">
+                <a:latin typeface="Arial" panose="020B0604020202020204" pitchFamily="34" charset="0"/>
+                <a:cs typeface="Arial" panose="020B0604020202020204" pitchFamily="34" charset="0"/>
+              </a:rPr>
+              <a:t>Sun., 12/5, 12:00 noon</a:t>
+            </a:r>
+          </a:p>
+          <a:p>
+            <a:endParaRPr lang="en-US" dirty="0"/>
+          </a:p>
+        </p:txBody>
+      </p:sp>
+    </p:spTree>
+    <p:extLst>
+      <p:ext uri="{BB962C8B-B14F-4D97-AF65-F5344CB8AC3E}">
+        <p14:creationId xmlns:p14="http://schemas.microsoft.com/office/powerpoint/2010/main" val="249432407"/>
       </p:ext>
     </p:extLst>
   </p:cSld>

</xml_diff>